<commit_message>
add link & character class
</commit_message>
<xml_diff>
--- a/ws_week12/SlideImages.pptx
+++ b/ws_week12/SlideImages.pptx
@@ -7,6 +7,7 @@
   <p:sldIdLst>
     <p:sldId id="263" r:id="rId5"/>
     <p:sldId id="264" r:id="rId6"/>
+    <p:sldId id="265" r:id="rId7"/>
   </p:sldIdLst>
   <p:sldSz cx="12192000" cy="6858000"/>
   <p:notesSz cx="6858000" cy="9144000"/>
@@ -3713,6 +3714,660 @@
 </p:sld>
 </file>
 
+<file path=ppt/slides/slide3.xml><?xml version="1.0" encoding="utf-8"?>
+<p:sld xmlns:a="http://schemas.openxmlformats.org/drawingml/2006/main" xmlns:r="http://schemas.openxmlformats.org/officeDocument/2006/relationships" xmlns:p="http://schemas.openxmlformats.org/presentationml/2006/main">
+  <p:cSld>
+    <p:bg>
+      <p:bgPr>
+        <a:noFill/>
+        <a:effectLst/>
+      </p:bgPr>
+    </p:bg>
+    <p:spTree>
+      <p:nvGrpSpPr>
+        <p:cNvPr id="1" name=""/>
+        <p:cNvGrpSpPr/>
+        <p:nvPr/>
+      </p:nvGrpSpPr>
+      <p:grpSpPr>
+        <a:xfrm>
+          <a:off x="0" y="0"/>
+          <a:ext cx="0" cy="0"/>
+          <a:chOff x="0" y="0"/>
+          <a:chExt cx="0" cy="0"/>
+        </a:xfrm>
+      </p:grpSpPr>
+      <p:graphicFrame>
+        <p:nvGraphicFramePr>
+          <p:cNvPr id="2" name="Table 1">
+            <a:extLst>
+              <a:ext uri="{FF2B5EF4-FFF2-40B4-BE49-F238E27FC236}">
+                <a16:creationId xmlns:a16="http://schemas.microsoft.com/office/drawing/2014/main" id="{E4A38B69-BBC5-4637-BBEC-9AA7DC1B2215}"/>
+              </a:ext>
+            </a:extLst>
+          </p:cNvPr>
+          <p:cNvGraphicFramePr>
+            <a:graphicFrameLocks noGrp="1"/>
+          </p:cNvGraphicFramePr>
+          <p:nvPr>
+            <p:extLst>
+              <p:ext uri="{D42A27DB-BD31-4B8C-83A1-F6EECF244321}">
+                <p14:modId xmlns:p14="http://schemas.microsoft.com/office/powerpoint/2010/main" val="1078905107"/>
+              </p:ext>
+            </p:extLst>
+          </p:nvPr>
+        </p:nvGraphicFramePr>
+        <p:xfrm>
+          <a:off x="962025" y="1797384"/>
+          <a:ext cx="10359910" cy="4186380"/>
+        </p:xfrm>
+        <a:graphic>
+          <a:graphicData uri="http://schemas.openxmlformats.org/drawingml/2006/table">
+            <a:tbl>
+              <a:tblPr>
+                <a:tableStyleId>{E8B1032C-EA38-4F05-BA0D-38AFFFC7BED3}</a:tableStyleId>
+              </a:tblPr>
+              <a:tblGrid>
+                <a:gridCol w="2676525">
+                  <a:extLst>
+                    <a:ext uri="{9D8B030D-6E8A-4147-A177-3AD203B41FA5}">
+                      <a16:colId xmlns:a16="http://schemas.microsoft.com/office/drawing/2014/main" val="781182839"/>
+                    </a:ext>
+                  </a:extLst>
+                </a:gridCol>
+                <a:gridCol w="7683385">
+                  <a:extLst>
+                    <a:ext uri="{9D8B030D-6E8A-4147-A177-3AD203B41FA5}">
+                      <a16:colId xmlns:a16="http://schemas.microsoft.com/office/drawing/2014/main" val="645835508"/>
+                    </a:ext>
+                  </a:extLst>
+                </a:gridCol>
+              </a:tblGrid>
+              <a:tr h="225741">
+                <a:tc>
+                  <a:txBody>
+                    <a:bodyPr/>
+                    <a:lstStyle/>
+                    <a:p>
+                      <a:pPr algn="ctr" fontAlgn="t"/>
+                      <a:r>
+                        <a:rPr lang="en-AU" sz="2000" dirty="0">
+                          <a:effectLst/>
+                        </a:rPr>
+                        <a:t>Method</a:t>
+                      </a:r>
+                    </a:p>
+                  </a:txBody>
+                  <a:tcPr marL="41679" marR="41679" marT="41679" marB="41679"/>
+                </a:tc>
+                <a:tc>
+                  <a:txBody>
+                    <a:bodyPr/>
+                    <a:lstStyle/>
+                    <a:p>
+                      <a:pPr algn="ctr" fontAlgn="t"/>
+                      <a:r>
+                        <a:rPr lang="en-AU" sz="2000" dirty="0">
+                          <a:effectLst/>
+                        </a:rPr>
+                        <a:t>Description</a:t>
+                      </a:r>
+                    </a:p>
+                  </a:txBody>
+                  <a:tcPr marL="41679" marR="41679" marT="41679" marB="41679"/>
+                </a:tc>
+                <a:extLst>
+                  <a:ext uri="{0D108BD9-81ED-4DB2-BD59-A6C34878D82A}">
+                    <a16:rowId xmlns:a16="http://schemas.microsoft.com/office/drawing/2014/main" val="1129700350"/>
+                  </a:ext>
+                </a:extLst>
+              </a:tr>
+              <a:tr h="225741">
+                <a:tc>
+                  <a:txBody>
+                    <a:bodyPr/>
+                    <a:lstStyle/>
+                    <a:p>
+                      <a:pPr algn="just" fontAlgn="t"/>
+                      <a:r>
+                        <a:rPr lang="en-GB" sz="2000" u="none" strike="noStrike" dirty="0" err="1">
+                          <a:effectLst/>
+                          <a:hlinkClick r:id="rId2"/>
+                        </a:rPr>
+                        <a:t>isLetter</a:t>
+                      </a:r>
+                      <a:r>
+                        <a:rPr lang="en-GB" sz="2000" u="none" strike="noStrike" dirty="0">
+                          <a:effectLst/>
+                          <a:hlinkClick r:id="rId2"/>
+                        </a:rPr>
+                        <a:t>()</a:t>
+                      </a:r>
+                      <a:endParaRPr lang="en-GB" sz="2000" dirty="0">
+                        <a:solidFill>
+                          <a:srgbClr val="000000"/>
+                        </a:solidFill>
+                        <a:effectLst/>
+                      </a:endParaRPr>
+                    </a:p>
+                  </a:txBody>
+                  <a:tcPr marL="41679" marR="41679" marT="41679" marB="41679"/>
+                </a:tc>
+                <a:tc>
+                  <a:txBody>
+                    <a:bodyPr/>
+                    <a:lstStyle/>
+                    <a:p>
+                      <a:pPr algn="just" fontAlgn="t"/>
+                      <a:r>
+                        <a:rPr lang="en-GB" sz="2000" dirty="0">
+                          <a:effectLst/>
+                        </a:rPr>
+                        <a:t>Determines whether the specified char value is a letter.</a:t>
+                      </a:r>
+                      <a:endParaRPr lang="en-GB" sz="2000" dirty="0">
+                        <a:solidFill>
+                          <a:srgbClr val="000000"/>
+                        </a:solidFill>
+                        <a:effectLst/>
+                      </a:endParaRPr>
+                    </a:p>
+                  </a:txBody>
+                  <a:tcPr marL="41679" marR="41679" marT="41679" marB="41679"/>
+                </a:tc>
+                <a:extLst>
+                  <a:ext uri="{0D108BD9-81ED-4DB2-BD59-A6C34878D82A}">
+                    <a16:rowId xmlns:a16="http://schemas.microsoft.com/office/drawing/2014/main" val="1359906957"/>
+                  </a:ext>
+                </a:extLst>
+              </a:tr>
+              <a:tr h="225741">
+                <a:tc>
+                  <a:txBody>
+                    <a:bodyPr/>
+                    <a:lstStyle/>
+                    <a:p>
+                      <a:pPr algn="just" fontAlgn="t"/>
+                      <a:r>
+                        <a:rPr lang="en-GB" sz="2000" u="none" strike="noStrike" dirty="0" err="1">
+                          <a:effectLst/>
+                          <a:hlinkClick r:id="rId3"/>
+                        </a:rPr>
+                        <a:t>isDigit</a:t>
+                      </a:r>
+                      <a:r>
+                        <a:rPr lang="en-GB" sz="2000" u="none" strike="noStrike" dirty="0">
+                          <a:effectLst/>
+                          <a:hlinkClick r:id="rId3"/>
+                        </a:rPr>
+                        <a:t>()</a:t>
+                      </a:r>
+                      <a:endParaRPr lang="en-GB" sz="2000" dirty="0">
+                        <a:solidFill>
+                          <a:srgbClr val="000000"/>
+                        </a:solidFill>
+                        <a:effectLst/>
+                      </a:endParaRPr>
+                    </a:p>
+                  </a:txBody>
+                  <a:tcPr marL="41679" marR="41679" marT="41679" marB="41679"/>
+                </a:tc>
+                <a:tc>
+                  <a:txBody>
+                    <a:bodyPr/>
+                    <a:lstStyle/>
+                    <a:p>
+                      <a:pPr algn="just" fontAlgn="t"/>
+                      <a:r>
+                        <a:rPr lang="en-GB" sz="2000" dirty="0">
+                          <a:effectLst/>
+                        </a:rPr>
+                        <a:t>Determines whether the specified char value is a digit.</a:t>
+                      </a:r>
+                      <a:endParaRPr lang="en-GB" sz="2000" dirty="0">
+                        <a:solidFill>
+                          <a:srgbClr val="000000"/>
+                        </a:solidFill>
+                        <a:effectLst/>
+                      </a:endParaRPr>
+                    </a:p>
+                  </a:txBody>
+                  <a:tcPr marL="41679" marR="41679" marT="41679" marB="41679"/>
+                </a:tc>
+                <a:extLst>
+                  <a:ext uri="{0D108BD9-81ED-4DB2-BD59-A6C34878D82A}">
+                    <a16:rowId xmlns:a16="http://schemas.microsoft.com/office/drawing/2014/main" val="3760295433"/>
+                  </a:ext>
+                </a:extLst>
+              </a:tr>
+              <a:tr h="225741">
+                <a:tc>
+                  <a:txBody>
+                    <a:bodyPr/>
+                    <a:lstStyle/>
+                    <a:p>
+                      <a:pPr algn="just" fontAlgn="t"/>
+                      <a:r>
+                        <a:rPr lang="en-GB" sz="2000" u="none" strike="noStrike" dirty="0" err="1">
+                          <a:effectLst/>
+                          <a:hlinkClick r:id="rId4"/>
+                        </a:rPr>
+                        <a:t>isWhitespace</a:t>
+                      </a:r>
+                      <a:r>
+                        <a:rPr lang="en-GB" sz="2000" u="none" strike="noStrike" dirty="0">
+                          <a:effectLst/>
+                          <a:hlinkClick r:id="rId4"/>
+                        </a:rPr>
+                        <a:t>()</a:t>
+                      </a:r>
+                      <a:endParaRPr lang="en-GB" sz="2000" dirty="0">
+                        <a:solidFill>
+                          <a:srgbClr val="000000"/>
+                        </a:solidFill>
+                        <a:effectLst/>
+                      </a:endParaRPr>
+                    </a:p>
+                  </a:txBody>
+                  <a:tcPr marL="41679" marR="41679" marT="41679" marB="41679"/>
+                </a:tc>
+                <a:tc>
+                  <a:txBody>
+                    <a:bodyPr/>
+                    <a:lstStyle/>
+                    <a:p>
+                      <a:pPr algn="just" fontAlgn="t"/>
+                      <a:r>
+                        <a:rPr lang="en-GB" sz="2000" dirty="0">
+                          <a:effectLst/>
+                        </a:rPr>
+                        <a:t>Determines whether the specified char value is white space.</a:t>
+                      </a:r>
+                      <a:endParaRPr lang="en-GB" sz="2000" dirty="0">
+                        <a:solidFill>
+                          <a:srgbClr val="000000"/>
+                        </a:solidFill>
+                        <a:effectLst/>
+                      </a:endParaRPr>
+                    </a:p>
+                  </a:txBody>
+                  <a:tcPr marL="41679" marR="41679" marT="41679" marB="41679"/>
+                </a:tc>
+                <a:extLst>
+                  <a:ext uri="{0D108BD9-81ED-4DB2-BD59-A6C34878D82A}">
+                    <a16:rowId xmlns:a16="http://schemas.microsoft.com/office/drawing/2014/main" val="2982900319"/>
+                  </a:ext>
+                </a:extLst>
+              </a:tr>
+              <a:tr h="225741">
+                <a:tc>
+                  <a:txBody>
+                    <a:bodyPr/>
+                    <a:lstStyle/>
+                    <a:p>
+                      <a:pPr algn="just" fontAlgn="t"/>
+                      <a:r>
+                        <a:rPr lang="en-GB" sz="2000" u="sng" dirty="0" err="1">
+                          <a:solidFill>
+                            <a:srgbClr val="000000"/>
+                          </a:solidFill>
+                          <a:effectLst/>
+                        </a:rPr>
+                        <a:t>isLetterOrDigit</a:t>
+                      </a:r>
+                      <a:r>
+                        <a:rPr lang="en-GB" sz="2000" u="sng" dirty="0">
+                          <a:solidFill>
+                            <a:srgbClr val="000000"/>
+                          </a:solidFill>
+                          <a:effectLst/>
+                        </a:rPr>
+                        <a:t>()</a:t>
+                      </a:r>
+                    </a:p>
+                  </a:txBody>
+                  <a:tcPr marL="41679" marR="41679" marT="41679" marB="41679"/>
+                </a:tc>
+                <a:tc>
+                  <a:txBody>
+                    <a:bodyPr/>
+                    <a:lstStyle/>
+                    <a:p>
+                      <a:pPr algn="just" fontAlgn="t"/>
+                      <a:r>
+                        <a:rPr lang="en-GB" sz="2000" dirty="0">
+                          <a:effectLst/>
+                        </a:rPr>
+                        <a:t>Determines whether the specified char value is either a letter or digit.</a:t>
+                      </a:r>
+                      <a:endParaRPr lang="en-GB" sz="2000" dirty="0">
+                        <a:solidFill>
+                          <a:srgbClr val="000000"/>
+                        </a:solidFill>
+                        <a:effectLst/>
+                      </a:endParaRPr>
+                    </a:p>
+                  </a:txBody>
+                  <a:tcPr marL="41679" marR="41679" marT="41679" marB="41679"/>
+                </a:tc>
+                <a:extLst>
+                  <a:ext uri="{0D108BD9-81ED-4DB2-BD59-A6C34878D82A}">
+                    <a16:rowId xmlns:a16="http://schemas.microsoft.com/office/drawing/2014/main" val="2907323182"/>
+                  </a:ext>
+                </a:extLst>
+              </a:tr>
+              <a:tr h="225741">
+                <a:tc>
+                  <a:txBody>
+                    <a:bodyPr/>
+                    <a:lstStyle/>
+                    <a:p>
+                      <a:pPr algn="just" fontAlgn="t"/>
+                      <a:r>
+                        <a:rPr lang="en-GB" sz="2000" u="none" strike="noStrike" dirty="0" err="1">
+                          <a:effectLst/>
+                          <a:hlinkClick r:id="rId5"/>
+                        </a:rPr>
+                        <a:t>isUpperCase</a:t>
+                      </a:r>
+                      <a:r>
+                        <a:rPr lang="en-GB" sz="2000" u="none" strike="noStrike" dirty="0">
+                          <a:effectLst/>
+                          <a:hlinkClick r:id="rId5"/>
+                        </a:rPr>
+                        <a:t>()</a:t>
+                      </a:r>
+                      <a:endParaRPr lang="en-GB" sz="2000" dirty="0">
+                        <a:solidFill>
+                          <a:srgbClr val="000000"/>
+                        </a:solidFill>
+                        <a:effectLst/>
+                      </a:endParaRPr>
+                    </a:p>
+                  </a:txBody>
+                  <a:tcPr marL="41679" marR="41679" marT="41679" marB="41679"/>
+                </a:tc>
+                <a:tc>
+                  <a:txBody>
+                    <a:bodyPr/>
+                    <a:lstStyle/>
+                    <a:p>
+                      <a:pPr algn="just" fontAlgn="t"/>
+                      <a:r>
+                        <a:rPr lang="en-GB" sz="2000" dirty="0">
+                          <a:effectLst/>
+                        </a:rPr>
+                        <a:t>Determines whether the specified char value is uppercase.</a:t>
+                      </a:r>
+                      <a:endParaRPr lang="en-GB" sz="2000" dirty="0">
+                        <a:solidFill>
+                          <a:srgbClr val="000000"/>
+                        </a:solidFill>
+                        <a:effectLst/>
+                      </a:endParaRPr>
+                    </a:p>
+                  </a:txBody>
+                  <a:tcPr marL="41679" marR="41679" marT="41679" marB="41679"/>
+                </a:tc>
+                <a:extLst>
+                  <a:ext uri="{0D108BD9-81ED-4DB2-BD59-A6C34878D82A}">
+                    <a16:rowId xmlns:a16="http://schemas.microsoft.com/office/drawing/2014/main" val="1202568483"/>
+                  </a:ext>
+                </a:extLst>
+              </a:tr>
+              <a:tr h="225741">
+                <a:tc>
+                  <a:txBody>
+                    <a:bodyPr/>
+                    <a:lstStyle/>
+                    <a:p>
+                      <a:pPr algn="just" fontAlgn="t"/>
+                      <a:r>
+                        <a:rPr lang="en-GB" sz="2000" u="none" strike="noStrike" dirty="0" err="1">
+                          <a:effectLst/>
+                          <a:hlinkClick r:id="rId6"/>
+                        </a:rPr>
+                        <a:t>isLowerCase</a:t>
+                      </a:r>
+                      <a:r>
+                        <a:rPr lang="en-GB" sz="2000" u="none" strike="noStrike" dirty="0">
+                          <a:effectLst/>
+                          <a:hlinkClick r:id="rId6"/>
+                        </a:rPr>
+                        <a:t>()</a:t>
+                      </a:r>
+                      <a:endParaRPr lang="en-GB" sz="2000" dirty="0">
+                        <a:solidFill>
+                          <a:srgbClr val="000000"/>
+                        </a:solidFill>
+                        <a:effectLst/>
+                      </a:endParaRPr>
+                    </a:p>
+                  </a:txBody>
+                  <a:tcPr marL="41679" marR="41679" marT="41679" marB="41679"/>
+                </a:tc>
+                <a:tc>
+                  <a:txBody>
+                    <a:bodyPr/>
+                    <a:lstStyle/>
+                    <a:p>
+                      <a:pPr algn="just" fontAlgn="t"/>
+                      <a:r>
+                        <a:rPr lang="en-GB" sz="2000" dirty="0">
+                          <a:effectLst/>
+                        </a:rPr>
+                        <a:t>Determines whether the specified char value is lowercase.</a:t>
+                      </a:r>
+                      <a:endParaRPr lang="en-GB" sz="2000" dirty="0">
+                        <a:solidFill>
+                          <a:srgbClr val="000000"/>
+                        </a:solidFill>
+                        <a:effectLst/>
+                      </a:endParaRPr>
+                    </a:p>
+                  </a:txBody>
+                  <a:tcPr marL="41679" marR="41679" marT="41679" marB="41679"/>
+                </a:tc>
+                <a:extLst>
+                  <a:ext uri="{0D108BD9-81ED-4DB2-BD59-A6C34878D82A}">
+                    <a16:rowId xmlns:a16="http://schemas.microsoft.com/office/drawing/2014/main" val="2575706715"/>
+                  </a:ext>
+                </a:extLst>
+              </a:tr>
+              <a:tr h="225741">
+                <a:tc>
+                  <a:txBody>
+                    <a:bodyPr/>
+                    <a:lstStyle/>
+                    <a:p>
+                      <a:pPr algn="just" fontAlgn="t"/>
+                      <a:r>
+                        <a:rPr lang="en-GB" sz="2000" u="none" strike="noStrike" dirty="0" err="1">
+                          <a:effectLst/>
+                          <a:hlinkClick r:id="rId7"/>
+                        </a:rPr>
+                        <a:t>toUpperCase</a:t>
+                      </a:r>
+                      <a:r>
+                        <a:rPr lang="en-GB" sz="2000" u="none" strike="noStrike" dirty="0">
+                          <a:effectLst/>
+                          <a:hlinkClick r:id="rId7"/>
+                        </a:rPr>
+                        <a:t>()</a:t>
+                      </a:r>
+                      <a:endParaRPr lang="en-GB" sz="2000" dirty="0">
+                        <a:solidFill>
+                          <a:srgbClr val="000000"/>
+                        </a:solidFill>
+                        <a:effectLst/>
+                      </a:endParaRPr>
+                    </a:p>
+                  </a:txBody>
+                  <a:tcPr marL="41679" marR="41679" marT="41679" marB="41679"/>
+                </a:tc>
+                <a:tc>
+                  <a:txBody>
+                    <a:bodyPr/>
+                    <a:lstStyle/>
+                    <a:p>
+                      <a:pPr algn="just" fontAlgn="t"/>
+                      <a:r>
+                        <a:rPr lang="en-GB" sz="2000" dirty="0">
+                          <a:effectLst/>
+                        </a:rPr>
+                        <a:t>Returns the uppercase form of the specified char value.</a:t>
+                      </a:r>
+                      <a:endParaRPr lang="en-GB" sz="2000" dirty="0">
+                        <a:solidFill>
+                          <a:srgbClr val="000000"/>
+                        </a:solidFill>
+                        <a:effectLst/>
+                      </a:endParaRPr>
+                    </a:p>
+                  </a:txBody>
+                  <a:tcPr marL="41679" marR="41679" marT="41679" marB="41679"/>
+                </a:tc>
+                <a:extLst>
+                  <a:ext uri="{0D108BD9-81ED-4DB2-BD59-A6C34878D82A}">
+                    <a16:rowId xmlns:a16="http://schemas.microsoft.com/office/drawing/2014/main" val="4008773031"/>
+                  </a:ext>
+                </a:extLst>
+              </a:tr>
+              <a:tr h="225741">
+                <a:tc>
+                  <a:txBody>
+                    <a:bodyPr/>
+                    <a:lstStyle/>
+                    <a:p>
+                      <a:pPr algn="just" fontAlgn="t"/>
+                      <a:r>
+                        <a:rPr lang="en-GB" sz="2000" u="none" strike="noStrike" dirty="0" err="1">
+                          <a:effectLst/>
+                          <a:hlinkClick r:id="rId8"/>
+                        </a:rPr>
+                        <a:t>toLowerCase</a:t>
+                      </a:r>
+                      <a:r>
+                        <a:rPr lang="en-GB" sz="2000" u="none" strike="noStrike" dirty="0">
+                          <a:effectLst/>
+                          <a:hlinkClick r:id="rId8"/>
+                        </a:rPr>
+                        <a:t>()</a:t>
+                      </a:r>
+                      <a:endParaRPr lang="en-GB" sz="2000" dirty="0">
+                        <a:solidFill>
+                          <a:srgbClr val="000000"/>
+                        </a:solidFill>
+                        <a:effectLst/>
+                      </a:endParaRPr>
+                    </a:p>
+                  </a:txBody>
+                  <a:tcPr marL="41679" marR="41679" marT="41679" marB="41679"/>
+                </a:tc>
+                <a:tc>
+                  <a:txBody>
+                    <a:bodyPr/>
+                    <a:lstStyle/>
+                    <a:p>
+                      <a:pPr algn="just" fontAlgn="t"/>
+                      <a:r>
+                        <a:rPr lang="en-GB" sz="2000" dirty="0">
+                          <a:effectLst/>
+                        </a:rPr>
+                        <a:t>Returns the lowercase form of the specified char value.</a:t>
+                      </a:r>
+                      <a:endParaRPr lang="en-GB" sz="2000" dirty="0">
+                        <a:solidFill>
+                          <a:srgbClr val="000000"/>
+                        </a:solidFill>
+                        <a:effectLst/>
+                      </a:endParaRPr>
+                    </a:p>
+                  </a:txBody>
+                  <a:tcPr marL="41679" marR="41679" marT="41679" marB="41679"/>
+                </a:tc>
+                <a:extLst>
+                  <a:ext uri="{0D108BD9-81ED-4DB2-BD59-A6C34878D82A}">
+                    <a16:rowId xmlns:a16="http://schemas.microsoft.com/office/drawing/2014/main" val="4229172573"/>
+                  </a:ext>
+                </a:extLst>
+              </a:tr>
+              <a:tr h="225741">
+                <a:tc>
+                  <a:txBody>
+                    <a:bodyPr/>
+                    <a:lstStyle/>
+                    <a:p>
+                      <a:pPr algn="just" fontAlgn="t"/>
+                      <a:r>
+                        <a:rPr lang="en-GB" sz="2000" u="none" strike="noStrike" dirty="0" err="1">
+                          <a:effectLst/>
+                          <a:hlinkClick r:id="rId9"/>
+                        </a:rPr>
+                        <a:t>toString</a:t>
+                      </a:r>
+                      <a:r>
+                        <a:rPr lang="en-GB" sz="2000" u="none" strike="noStrike" dirty="0">
+                          <a:effectLst/>
+                          <a:hlinkClick r:id="rId9"/>
+                        </a:rPr>
+                        <a:t>()</a:t>
+                      </a:r>
+                      <a:endParaRPr lang="en-GB" sz="2000" dirty="0">
+                        <a:solidFill>
+                          <a:srgbClr val="000000"/>
+                        </a:solidFill>
+                        <a:effectLst/>
+                      </a:endParaRPr>
+                    </a:p>
+                  </a:txBody>
+                  <a:tcPr marL="41679" marR="41679" marT="41679" marB="41679"/>
+                </a:tc>
+                <a:tc>
+                  <a:txBody>
+                    <a:bodyPr/>
+                    <a:lstStyle/>
+                    <a:p>
+                      <a:pPr algn="just" fontAlgn="t"/>
+                      <a:r>
+                        <a:rPr lang="en-GB" sz="2000" dirty="0">
+                          <a:effectLst/>
+                        </a:rPr>
+                        <a:t>Returns a String object representing the specified character value that is, a one-character string.</a:t>
+                      </a:r>
+                      <a:endParaRPr lang="en-GB" sz="2000" dirty="0">
+                        <a:solidFill>
+                          <a:srgbClr val="000000"/>
+                        </a:solidFill>
+                        <a:effectLst/>
+                      </a:endParaRPr>
+                    </a:p>
+                  </a:txBody>
+                  <a:tcPr marL="41679" marR="41679" marT="41679" marB="41679"/>
+                </a:tc>
+                <a:extLst>
+                  <a:ext uri="{0D108BD9-81ED-4DB2-BD59-A6C34878D82A}">
+                    <a16:rowId xmlns:a16="http://schemas.microsoft.com/office/drawing/2014/main" val="2254238903"/>
+                  </a:ext>
+                </a:extLst>
+              </a:tr>
+            </a:tbl>
+          </a:graphicData>
+        </a:graphic>
+      </p:graphicFrame>
+    </p:spTree>
+    <p:extLst>
+      <p:ext uri="{BB962C8B-B14F-4D97-AF65-F5344CB8AC3E}">
+        <p14:creationId xmlns:p14="http://schemas.microsoft.com/office/powerpoint/2010/main" val="742287574"/>
+      </p:ext>
+    </p:extLst>
+  </p:cSld>
+  <p:clrMapOvr>
+    <a:masterClrMapping/>
+  </p:clrMapOvr>
+</p:sld>
+</file>
+
 <file path=ppt/theme/theme1.xml><?xml version="1.0" encoding="utf-8"?>
 <a:theme xmlns:a="http://schemas.openxmlformats.org/drawingml/2006/main" name="Office Theme">
   <a:themeElements>
@@ -4009,9 +4664,12 @@
 </file>
 
 <file path=customXml/item1.xml><?xml version="1.0" encoding="utf-8"?>
-<p:properties xmlns:p="http://schemas.microsoft.com/office/2006/metadata/properties" xmlns:xsi="http://www.w3.org/2001/XMLSchema-instance" xmlns:pc="http://schemas.microsoft.com/office/infopath/2007/PartnerControls">
-  <documentManagement/>
-</p:properties>
+<?mso-contentType ?>
+<FormTemplates xmlns="http://schemas.microsoft.com/sharepoint/v3/contenttype/forms">
+  <Display>DocumentLibraryForm</Display>
+  <Edit>DocumentLibraryForm</Edit>
+  <New>DocumentLibraryForm</New>
+</FormTemplates>
 </file>
 
 <file path=customXml/item2.xml><?xml version="1.0" encoding="utf-8"?>
@@ -4252,27 +4910,15 @@
 </file>
 
 <file path=customXml/item3.xml><?xml version="1.0" encoding="utf-8"?>
-<?mso-contentType ?>
-<FormTemplates xmlns="http://schemas.microsoft.com/sharepoint/v3/contenttype/forms">
-  <Display>DocumentLibraryForm</Display>
-  <Edit>DocumentLibraryForm</Edit>
-  <New>DocumentLibraryForm</New>
-</FormTemplates>
+<p:properties xmlns:p="http://schemas.microsoft.com/office/2006/metadata/properties" xmlns:xsi="http://www.w3.org/2001/XMLSchema-instance" xmlns:pc="http://schemas.microsoft.com/office/infopath/2007/PartnerControls">
+  <documentManagement/>
+</p:properties>
 </file>
 
 <file path=customXml/itemProps1.xml><?xml version="1.0" encoding="utf-8"?>
-<ds:datastoreItem xmlns:ds="http://schemas.openxmlformats.org/officeDocument/2006/customXml" ds:itemID="{F69ED5F8-608B-489A-BDCF-C856FF183B36}">
+<ds:datastoreItem xmlns:ds="http://schemas.openxmlformats.org/officeDocument/2006/customXml" ds:itemID="{8D04D959-D2B4-44F5-8E85-2D3B6F3F223E}">
   <ds:schemaRefs>
-    <ds:schemaRef ds:uri="http://purl.org/dc/terms/"/>
-    <ds:schemaRef ds:uri="http://schemas.microsoft.com/office/2006/metadata/properties"/>
-    <ds:schemaRef ds:uri="http://schemas.microsoft.com/office/infopath/2007/PartnerControls"/>
-    <ds:schemaRef ds:uri="http://www.w3.org/XML/1998/namespace"/>
-    <ds:schemaRef ds:uri="bd44e2ee-3c8b-430e-a5d4-7c9e45a5e279"/>
-    <ds:schemaRef ds:uri="http://schemas.microsoft.com/office/2006/documentManagement/types"/>
-    <ds:schemaRef ds:uri="9f712a78-d248-4d8e-9efc-913250726f4d"/>
-    <ds:schemaRef ds:uri="http://purl.org/dc/dcmitype/"/>
-    <ds:schemaRef ds:uri="http://schemas.openxmlformats.org/package/2006/metadata/core-properties"/>
-    <ds:schemaRef ds:uri="http://purl.org/dc/elements/1.1/"/>
+    <ds:schemaRef ds:uri="http://schemas.microsoft.com/sharepoint/v3/contenttype/forms"/>
   </ds:schemaRefs>
 </ds:datastoreItem>
 </file>
@@ -4297,9 +4943,18 @@
 </file>
 
 <file path=customXml/itemProps3.xml><?xml version="1.0" encoding="utf-8"?>
-<ds:datastoreItem xmlns:ds="http://schemas.openxmlformats.org/officeDocument/2006/customXml" ds:itemID="{8D04D959-D2B4-44F5-8E85-2D3B6F3F223E}">
+<ds:datastoreItem xmlns:ds="http://schemas.openxmlformats.org/officeDocument/2006/customXml" ds:itemID="{F69ED5F8-608B-489A-BDCF-C856FF183B36}">
   <ds:schemaRefs>
-    <ds:schemaRef ds:uri="http://schemas.microsoft.com/sharepoint/v3/contenttype/forms"/>
+    <ds:schemaRef ds:uri="http://purl.org/dc/terms/"/>
+    <ds:schemaRef ds:uri="http://schemas.microsoft.com/office/2006/metadata/properties"/>
+    <ds:schemaRef ds:uri="http://schemas.microsoft.com/office/infopath/2007/PartnerControls"/>
+    <ds:schemaRef ds:uri="http://www.w3.org/XML/1998/namespace"/>
+    <ds:schemaRef ds:uri="bd44e2ee-3c8b-430e-a5d4-7c9e45a5e279"/>
+    <ds:schemaRef ds:uri="http://schemas.microsoft.com/office/2006/documentManagement/types"/>
+    <ds:schemaRef ds:uri="9f712a78-d248-4d8e-9efc-913250726f4d"/>
+    <ds:schemaRef ds:uri="http://purl.org/dc/dcmitype/"/>
+    <ds:schemaRef ds:uri="http://schemas.openxmlformats.org/package/2006/metadata/core-properties"/>
+    <ds:schemaRef ds:uri="http://purl.org/dc/elements/1.1/"/>
   </ds:schemaRefs>
 </ds:datastoreItem>
 </file>
</xml_diff>